<commit_message>
Change in the project scope based on faulty feedback
We made changes based on feedback received in M5 and Prof. Saad Zaman
</commit_message>
<xml_diff>
--- a/Documentation/Model Methodology.pptx
+++ b/Documentation/Model Methodology.pptx
@@ -7,6 +7,10 @@
   <p:sldIdLst>
     <p:sldId id="256" r:id="rId2"/>
     <p:sldId id="257" r:id="rId3"/>
+    <p:sldId id="258" r:id="rId4"/>
+    <p:sldId id="259" r:id="rId5"/>
+    <p:sldId id="260" r:id="rId6"/>
+    <p:sldId id="261" r:id="rId7"/>
   </p:sldIdLst>
   <p:sldSz cx="12192000" cy="6858000"/>
   <p:notesSz cx="6858000" cy="9144000"/>
@@ -105,6 +109,11 @@
       </a:defRPr>
     </a:lvl9pPr>
   </p:defaultTextStyle>
+  <p:extLst>
+    <p:ext uri="{EFAFB233-063F-42B5-8137-9DF3F51BA10A}">
+      <p15:sldGuideLst xmlns:p15="http://schemas.microsoft.com/office/powerpoint/2012/main"/>
+    </p:ext>
+  </p:extLst>
 </p:presentation>
 </file>
 
@@ -247,7 +256,7 @@
           <a:p>
             <a:fld id="{FB918670-3F94-425F-ACB4-535DC5EB5CFB}" type="datetimeFigureOut">
               <a:rPr lang="en-IN" smtClean="0"/>
-              <a:t>21-09-24</a:t>
+              <a:t>25-09-24</a:t>
             </a:fld>
             <a:endParaRPr lang="en-IN"/>
           </a:p>
@@ -458,7 +467,7 @@
           <a:p>
             <a:fld id="{FB918670-3F94-425F-ACB4-535DC5EB5CFB}" type="datetimeFigureOut">
               <a:rPr lang="en-IN" smtClean="0"/>
-              <a:t>21-09-24</a:t>
+              <a:t>25-09-24</a:t>
             </a:fld>
             <a:endParaRPr lang="en-IN"/>
           </a:p>
@@ -673,7 +682,7 @@
           <a:p>
             <a:fld id="{FB918670-3F94-425F-ACB4-535DC5EB5CFB}" type="datetimeFigureOut">
               <a:rPr lang="en-IN" smtClean="0"/>
-              <a:t>21-09-24</a:t>
+              <a:t>25-09-24</a:t>
             </a:fld>
             <a:endParaRPr lang="en-IN"/>
           </a:p>
@@ -874,7 +883,7 @@
           <a:p>
             <a:fld id="{FB918670-3F94-425F-ACB4-535DC5EB5CFB}" type="datetimeFigureOut">
               <a:rPr lang="en-IN" smtClean="0"/>
-              <a:t>21-09-24</a:t>
+              <a:t>25-09-24</a:t>
             </a:fld>
             <a:endParaRPr lang="en-IN"/>
           </a:p>
@@ -1153,7 +1162,7 @@
           <a:p>
             <a:fld id="{FB918670-3F94-425F-ACB4-535DC5EB5CFB}" type="datetimeFigureOut">
               <a:rPr lang="en-IN" smtClean="0"/>
-              <a:t>21-09-24</a:t>
+              <a:t>25-09-24</a:t>
             </a:fld>
             <a:endParaRPr lang="en-IN"/>
           </a:p>
@@ -1421,7 +1430,7 @@
           <a:p>
             <a:fld id="{FB918670-3F94-425F-ACB4-535DC5EB5CFB}" type="datetimeFigureOut">
               <a:rPr lang="en-IN" smtClean="0"/>
-              <a:t>21-09-24</a:t>
+              <a:t>25-09-24</a:t>
             </a:fld>
             <a:endParaRPr lang="en-IN"/>
           </a:p>
@@ -1837,7 +1846,7 @@
           <a:p>
             <a:fld id="{FB918670-3F94-425F-ACB4-535DC5EB5CFB}" type="datetimeFigureOut">
               <a:rPr lang="en-IN" smtClean="0"/>
-              <a:t>21-09-24</a:t>
+              <a:t>25-09-24</a:t>
             </a:fld>
             <a:endParaRPr lang="en-IN"/>
           </a:p>
@@ -1986,7 +1995,7 @@
           <a:p>
             <a:fld id="{FB918670-3F94-425F-ACB4-535DC5EB5CFB}" type="datetimeFigureOut">
               <a:rPr lang="en-IN" smtClean="0"/>
-              <a:t>21-09-24</a:t>
+              <a:t>25-09-24</a:t>
             </a:fld>
             <a:endParaRPr lang="en-IN"/>
           </a:p>
@@ -2112,7 +2121,7 @@
           <a:p>
             <a:fld id="{FB918670-3F94-425F-ACB4-535DC5EB5CFB}" type="datetimeFigureOut">
               <a:rPr lang="en-IN" smtClean="0"/>
-              <a:t>21-09-24</a:t>
+              <a:t>25-09-24</a:t>
             </a:fld>
             <a:endParaRPr lang="en-IN"/>
           </a:p>
@@ -2363,7 +2372,7 @@
           <a:p>
             <a:fld id="{FB918670-3F94-425F-ACB4-535DC5EB5CFB}" type="datetimeFigureOut">
               <a:rPr lang="en-IN" smtClean="0"/>
-              <a:t>21-09-24</a:t>
+              <a:t>25-09-24</a:t>
             </a:fld>
             <a:endParaRPr lang="en-IN"/>
           </a:p>
@@ -2808,7 +2817,7 @@
           <a:p>
             <a:fld id="{FB918670-3F94-425F-ACB4-535DC5EB5CFB}" type="datetimeFigureOut">
               <a:rPr lang="en-IN" smtClean="0"/>
-              <a:t>21-09-24</a:t>
+              <a:t>25-09-24</a:t>
             </a:fld>
             <a:endParaRPr lang="en-IN"/>
           </a:p>
@@ -3135,7 +3144,7 @@
           <a:p>
             <a:fld id="{FB918670-3F94-425F-ACB4-535DC5EB5CFB}" type="datetimeFigureOut">
               <a:rPr lang="en-IN" smtClean="0"/>
-              <a:t>21-09-24</a:t>
+              <a:t>25-09-24</a:t>
             </a:fld>
             <a:endParaRPr lang="en-IN"/>
           </a:p>
@@ -3874,7 +3883,7 @@
                 <a:rPr lang="en-IN" sz="1200" dirty="0">
                   <a:latin typeface="Aptos" panose="020B0004020202020204" pitchFamily="34" charset="0"/>
                 </a:rPr>
-                <a:t>Filter out securities for analysis</a:t>
+                <a:t>Data Imputation and Augmentation</a:t>
               </a:r>
             </a:p>
           </p:txBody>
@@ -3936,7 +3945,7 @@
                 <a:rPr lang="en-IN" sz="1200" dirty="0">
                   <a:latin typeface="Aptos" panose="020B0004020202020204" pitchFamily="34" charset="0"/>
                 </a:rPr>
-                <a:t>Data Imputation and Augmentation</a:t>
+                <a:t>Filter out securities for analysis</a:t>
               </a:r>
             </a:p>
           </p:txBody>
@@ -4579,6 +4588,512 @@
 </p:sld>
 </file>
 
+<file path=ppt/slides/slide3.xml><?xml version="1.0" encoding="utf-8"?>
+<p:sld xmlns:a="http://schemas.openxmlformats.org/drawingml/2006/main" xmlns:r="http://schemas.openxmlformats.org/officeDocument/2006/relationships" xmlns:p="http://schemas.openxmlformats.org/presentationml/2006/main">
+  <p:cSld>
+    <p:spTree>
+      <p:nvGrpSpPr>
+        <p:cNvPr id="1" name=""/>
+        <p:cNvGrpSpPr/>
+        <p:nvPr/>
+      </p:nvGrpSpPr>
+      <p:grpSpPr>
+        <a:xfrm>
+          <a:off x="0" y="0"/>
+          <a:ext cx="0" cy="0"/>
+          <a:chOff x="0" y="0"/>
+          <a:chExt cx="0" cy="0"/>
+        </a:xfrm>
+      </p:grpSpPr>
+      <p:sp>
+        <p:nvSpPr>
+          <p:cNvPr id="2" name="Title 1">
+            <a:extLst>
+              <a:ext uri="{FF2B5EF4-FFF2-40B4-BE49-F238E27FC236}">
+                <a16:creationId xmlns:a16="http://schemas.microsoft.com/office/drawing/2014/main" id="{F774CA2B-3FF3-56CC-3BB1-2D6101978414}"/>
+              </a:ext>
+            </a:extLst>
+          </p:cNvPr>
+          <p:cNvSpPr>
+            <a:spLocks noGrp="1"/>
+          </p:cNvSpPr>
+          <p:nvPr>
+            <p:ph type="title"/>
+          </p:nvPr>
+        </p:nvSpPr>
+        <p:spPr/>
+        <p:txBody>
+          <a:bodyPr/>
+          <a:lstStyle/>
+          <a:p>
+            <a:r>
+              <a:rPr lang="en-IN" dirty="0"/>
+              <a:t>Import data</a:t>
+            </a:r>
+          </a:p>
+        </p:txBody>
+      </p:sp>
+      <p:sp>
+        <p:nvSpPr>
+          <p:cNvPr id="3" name="Content Placeholder 2">
+            <a:extLst>
+              <a:ext uri="{FF2B5EF4-FFF2-40B4-BE49-F238E27FC236}">
+                <a16:creationId xmlns:a16="http://schemas.microsoft.com/office/drawing/2014/main" id="{A70910F6-7E5C-8034-51CD-BF6663F72176}"/>
+              </a:ext>
+            </a:extLst>
+          </p:cNvPr>
+          <p:cNvSpPr>
+            <a:spLocks noGrp="1"/>
+          </p:cNvSpPr>
+          <p:nvPr>
+            <p:ph idx="1"/>
+          </p:nvPr>
+        </p:nvSpPr>
+        <p:spPr/>
+        <p:txBody>
+          <a:bodyPr/>
+          <a:lstStyle/>
+          <a:p>
+            <a:r>
+              <a:rPr lang="en-IN" dirty="0"/>
+              <a:t>The data for the project is obtained from </a:t>
+            </a:r>
+            <a:r>
+              <a:rPr lang="en-IN" dirty="0" err="1"/>
+              <a:t>Zerodha</a:t>
+            </a:r>
+            <a:r>
+              <a:rPr lang="en-IN" dirty="0"/>
+              <a:t>, a leading brokerage firm of the National Stock Exchange, India</a:t>
+            </a:r>
+          </a:p>
+          <a:p>
+            <a:r>
+              <a:rPr lang="en-IN" dirty="0"/>
+              <a:t>The entire dataset consists of approximately 2000 stocks with 1M interval data</a:t>
+            </a:r>
+          </a:p>
+          <a:p>
+            <a:r>
+              <a:rPr lang="en-IN" dirty="0"/>
+              <a:t>Activities</a:t>
+            </a:r>
+          </a:p>
+          <a:p>
+            <a:pPr lvl="1"/>
+            <a:r>
+              <a:rPr lang="en-IN" dirty="0"/>
+              <a:t>Data sourcing (using APIs to pull data) of currently traded securities – OLHC and Volume</a:t>
+            </a:r>
+          </a:p>
+          <a:p>
+            <a:pPr lvl="1"/>
+            <a:r>
+              <a:rPr lang="en-IN" dirty="0"/>
+              <a:t>Data sourcing of delisted securities</a:t>
+            </a:r>
+          </a:p>
+          <a:p>
+            <a:pPr lvl="1"/>
+            <a:endParaRPr lang="en-IN" dirty="0"/>
+          </a:p>
+          <a:p>
+            <a:pPr lvl="1"/>
+            <a:endParaRPr lang="en-IN" dirty="0"/>
+          </a:p>
+        </p:txBody>
+      </p:sp>
+    </p:spTree>
+    <p:extLst>
+      <p:ext uri="{BB962C8B-B14F-4D97-AF65-F5344CB8AC3E}">
+        <p14:creationId xmlns:p14="http://schemas.microsoft.com/office/powerpoint/2010/main" val="2280648981"/>
+      </p:ext>
+    </p:extLst>
+  </p:cSld>
+  <p:clrMapOvr>
+    <a:masterClrMapping/>
+  </p:clrMapOvr>
+</p:sld>
+</file>
+
+<file path=ppt/slides/slide4.xml><?xml version="1.0" encoding="utf-8"?>
+<p:sld xmlns:a="http://schemas.openxmlformats.org/drawingml/2006/main" xmlns:r="http://schemas.openxmlformats.org/officeDocument/2006/relationships" xmlns:p="http://schemas.openxmlformats.org/presentationml/2006/main">
+  <p:cSld>
+    <p:spTree>
+      <p:nvGrpSpPr>
+        <p:cNvPr id="1" name=""/>
+        <p:cNvGrpSpPr/>
+        <p:nvPr/>
+      </p:nvGrpSpPr>
+      <p:grpSpPr>
+        <a:xfrm>
+          <a:off x="0" y="0"/>
+          <a:ext cx="0" cy="0"/>
+          <a:chOff x="0" y="0"/>
+          <a:chExt cx="0" cy="0"/>
+        </a:xfrm>
+      </p:grpSpPr>
+      <p:sp>
+        <p:nvSpPr>
+          <p:cNvPr id="2" name="Title 1">
+            <a:extLst>
+              <a:ext uri="{FF2B5EF4-FFF2-40B4-BE49-F238E27FC236}">
+                <a16:creationId xmlns:a16="http://schemas.microsoft.com/office/drawing/2014/main" id="{F12186FE-D9A8-E0BD-BD97-B2B745D95DDA}"/>
+              </a:ext>
+            </a:extLst>
+          </p:cNvPr>
+          <p:cNvSpPr>
+            <a:spLocks noGrp="1"/>
+          </p:cNvSpPr>
+          <p:nvPr>
+            <p:ph type="title"/>
+          </p:nvPr>
+        </p:nvSpPr>
+        <p:spPr/>
+        <p:txBody>
+          <a:bodyPr/>
+          <a:lstStyle/>
+          <a:p>
+            <a:r>
+              <a:rPr lang="en-IN" dirty="0"/>
+              <a:t>DATA AUGMENTATION and imputation</a:t>
+            </a:r>
+          </a:p>
+        </p:txBody>
+      </p:sp>
+      <p:sp>
+        <p:nvSpPr>
+          <p:cNvPr id="3" name="Content Placeholder 2">
+            <a:extLst>
+              <a:ext uri="{FF2B5EF4-FFF2-40B4-BE49-F238E27FC236}">
+                <a16:creationId xmlns:a16="http://schemas.microsoft.com/office/drawing/2014/main" id="{96943412-04B2-A63B-1453-7A5A1B9CCCE4}"/>
+              </a:ext>
+            </a:extLst>
+          </p:cNvPr>
+          <p:cNvSpPr>
+            <a:spLocks noGrp="1"/>
+          </p:cNvSpPr>
+          <p:nvPr>
+            <p:ph idx="1"/>
+          </p:nvPr>
+        </p:nvSpPr>
+        <p:spPr/>
+        <p:txBody>
+          <a:bodyPr/>
+          <a:lstStyle/>
+          <a:p>
+            <a:r>
+              <a:rPr lang="en-IN" dirty="0"/>
+              <a:t>Each of the securities traded/delisted from the stock exchange is augmented with the additional information like:</a:t>
+            </a:r>
+          </a:p>
+          <a:p>
+            <a:pPr lvl="1"/>
+            <a:r>
+              <a:rPr lang="en-IN" dirty="0"/>
+              <a:t>Sector information</a:t>
+            </a:r>
+          </a:p>
+          <a:p>
+            <a:pPr lvl="1"/>
+            <a:r>
+              <a:rPr lang="en-IN" dirty="0"/>
+              <a:t>Delivery percentage, VWAP</a:t>
+            </a:r>
+          </a:p>
+          <a:p>
+            <a:r>
+              <a:rPr lang="en-IN" dirty="0"/>
+              <a:t>The exchange data is sometime fraught with error and the following activities will be performed to get rid of the challenges:</a:t>
+            </a:r>
+          </a:p>
+          <a:p>
+            <a:pPr lvl="1"/>
+            <a:r>
+              <a:rPr lang="en-IN" dirty="0"/>
+              <a:t>Forward/Backward Fill</a:t>
+            </a:r>
+          </a:p>
+          <a:p>
+            <a:pPr lvl="1"/>
+            <a:r>
+              <a:rPr lang="en-IN" dirty="0"/>
+              <a:t>Linear Interpolation</a:t>
+            </a:r>
+          </a:p>
+        </p:txBody>
+      </p:sp>
+    </p:spTree>
+    <p:extLst>
+      <p:ext uri="{BB962C8B-B14F-4D97-AF65-F5344CB8AC3E}">
+        <p14:creationId xmlns:p14="http://schemas.microsoft.com/office/powerpoint/2010/main" val="2756309639"/>
+      </p:ext>
+    </p:extLst>
+  </p:cSld>
+  <p:clrMapOvr>
+    <a:masterClrMapping/>
+  </p:clrMapOvr>
+</p:sld>
+</file>
+
+<file path=ppt/slides/slide5.xml><?xml version="1.0" encoding="utf-8"?>
+<p:sld xmlns:a="http://schemas.openxmlformats.org/drawingml/2006/main" xmlns:r="http://schemas.openxmlformats.org/officeDocument/2006/relationships" xmlns:p="http://schemas.openxmlformats.org/presentationml/2006/main">
+  <p:cSld>
+    <p:spTree>
+      <p:nvGrpSpPr>
+        <p:cNvPr id="1" name=""/>
+        <p:cNvGrpSpPr/>
+        <p:nvPr/>
+      </p:nvGrpSpPr>
+      <p:grpSpPr>
+        <a:xfrm>
+          <a:off x="0" y="0"/>
+          <a:ext cx="0" cy="0"/>
+          <a:chOff x="0" y="0"/>
+          <a:chExt cx="0" cy="0"/>
+        </a:xfrm>
+      </p:grpSpPr>
+      <p:sp>
+        <p:nvSpPr>
+          <p:cNvPr id="2" name="Title 1">
+            <a:extLst>
+              <a:ext uri="{FF2B5EF4-FFF2-40B4-BE49-F238E27FC236}">
+                <a16:creationId xmlns:a16="http://schemas.microsoft.com/office/drawing/2014/main" id="{F12186FE-D9A8-E0BD-BD97-B2B745D95DDA}"/>
+              </a:ext>
+            </a:extLst>
+          </p:cNvPr>
+          <p:cNvSpPr>
+            <a:spLocks noGrp="1"/>
+          </p:cNvSpPr>
+          <p:nvPr>
+            <p:ph type="title"/>
+          </p:nvPr>
+        </p:nvSpPr>
+        <p:spPr/>
+        <p:txBody>
+          <a:bodyPr/>
+          <a:lstStyle/>
+          <a:p>
+            <a:r>
+              <a:rPr lang="en-IN" dirty="0"/>
+              <a:t>Securities FILTERING</a:t>
+            </a:r>
+          </a:p>
+        </p:txBody>
+      </p:sp>
+      <p:sp>
+        <p:nvSpPr>
+          <p:cNvPr id="3" name="Content Placeholder 2">
+            <a:extLst>
+              <a:ext uri="{FF2B5EF4-FFF2-40B4-BE49-F238E27FC236}">
+                <a16:creationId xmlns:a16="http://schemas.microsoft.com/office/drawing/2014/main" id="{96943412-04B2-A63B-1453-7A5A1B9CCCE4}"/>
+              </a:ext>
+            </a:extLst>
+          </p:cNvPr>
+          <p:cNvSpPr>
+            <a:spLocks noGrp="1"/>
+          </p:cNvSpPr>
+          <p:nvPr>
+            <p:ph idx="1"/>
+          </p:nvPr>
+        </p:nvSpPr>
+        <p:spPr/>
+        <p:txBody>
+          <a:bodyPr/>
+          <a:lstStyle/>
+          <a:p>
+            <a:r>
+              <a:rPr lang="en-IN" dirty="0"/>
+              <a:t>The universe of securities under our ambit will be pruned periodically.  The filtering out of securities will be done based on volumetric analysis.</a:t>
+            </a:r>
+          </a:p>
+          <a:p>
+            <a:r>
+              <a:rPr lang="en-IN" dirty="0"/>
+              <a:t>The system will remove securities which do not meet a volume threshold so that we do not run into slippage costs </a:t>
+            </a:r>
+          </a:p>
+        </p:txBody>
+      </p:sp>
+    </p:spTree>
+    <p:extLst>
+      <p:ext uri="{BB962C8B-B14F-4D97-AF65-F5344CB8AC3E}">
+        <p14:creationId xmlns:p14="http://schemas.microsoft.com/office/powerpoint/2010/main" val="708265854"/>
+      </p:ext>
+    </p:extLst>
+  </p:cSld>
+  <p:clrMapOvr>
+    <a:masterClrMapping/>
+  </p:clrMapOvr>
+</p:sld>
+</file>
+
+<file path=ppt/slides/slide6.xml><?xml version="1.0" encoding="utf-8"?>
+<p:sld xmlns:a="http://schemas.openxmlformats.org/drawingml/2006/main" xmlns:r="http://schemas.openxmlformats.org/officeDocument/2006/relationships" xmlns:p="http://schemas.openxmlformats.org/presentationml/2006/main">
+  <p:cSld>
+    <p:spTree>
+      <p:nvGrpSpPr>
+        <p:cNvPr id="1" name=""/>
+        <p:cNvGrpSpPr/>
+        <p:nvPr/>
+      </p:nvGrpSpPr>
+      <p:grpSpPr>
+        <a:xfrm>
+          <a:off x="0" y="0"/>
+          <a:ext cx="0" cy="0"/>
+          <a:chOff x="0" y="0"/>
+          <a:chExt cx="0" cy="0"/>
+        </a:xfrm>
+      </p:grpSpPr>
+      <p:sp>
+        <p:nvSpPr>
+          <p:cNvPr id="2" name="Title 1">
+            <a:extLst>
+              <a:ext uri="{FF2B5EF4-FFF2-40B4-BE49-F238E27FC236}">
+                <a16:creationId xmlns:a16="http://schemas.microsoft.com/office/drawing/2014/main" id="{F12186FE-D9A8-E0BD-BD97-B2B745D95DDA}"/>
+              </a:ext>
+            </a:extLst>
+          </p:cNvPr>
+          <p:cNvSpPr>
+            <a:spLocks noGrp="1"/>
+          </p:cNvSpPr>
+          <p:nvPr>
+            <p:ph type="title"/>
+          </p:nvPr>
+        </p:nvSpPr>
+        <p:spPr/>
+        <p:txBody>
+          <a:bodyPr/>
+          <a:lstStyle/>
+          <a:p>
+            <a:r>
+              <a:rPr lang="en-IN" dirty="0"/>
+              <a:t>Determination of momentum</a:t>
+            </a:r>
+          </a:p>
+        </p:txBody>
+      </p:sp>
+      <p:sp>
+        <p:nvSpPr>
+          <p:cNvPr id="3" name="Content Placeholder 2">
+            <a:extLst>
+              <a:ext uri="{FF2B5EF4-FFF2-40B4-BE49-F238E27FC236}">
+                <a16:creationId xmlns:a16="http://schemas.microsoft.com/office/drawing/2014/main" id="{96943412-04B2-A63B-1453-7A5A1B9CCCE4}"/>
+              </a:ext>
+            </a:extLst>
+          </p:cNvPr>
+          <p:cNvSpPr>
+            <a:spLocks noGrp="1"/>
+          </p:cNvSpPr>
+          <p:nvPr>
+            <p:ph idx="1"/>
+          </p:nvPr>
+        </p:nvSpPr>
+        <p:spPr/>
+        <p:txBody>
+          <a:bodyPr/>
+          <a:lstStyle/>
+          <a:p>
+            <a:r>
+              <a:rPr lang="en-IN" dirty="0"/>
+              <a:t>The Momentum will be done on the basis of technical indicators:</a:t>
+            </a:r>
+          </a:p>
+          <a:p>
+            <a:pPr lvl="1"/>
+            <a:r>
+              <a:rPr lang="en-IN" dirty="0" err="1"/>
+              <a:t>Heiken</a:t>
+            </a:r>
+            <a:r>
+              <a:rPr lang="en-IN" dirty="0"/>
+              <a:t> </a:t>
+            </a:r>
+            <a:r>
+              <a:rPr lang="en-IN" dirty="0" err="1"/>
+              <a:t>Ashi</a:t>
+            </a:r>
+            <a:r>
+              <a:rPr lang="en-IN" dirty="0"/>
+              <a:t> Candles (HA)</a:t>
+            </a:r>
+          </a:p>
+          <a:p>
+            <a:pPr lvl="1"/>
+            <a:r>
+              <a:rPr lang="en-IN" dirty="0"/>
+              <a:t>Simple Moving Average (SMA)</a:t>
+            </a:r>
+          </a:p>
+          <a:p>
+            <a:pPr lvl="1"/>
+            <a:r>
+              <a:rPr lang="en-IN" dirty="0"/>
+              <a:t>Standard Deviation (STDDEV)</a:t>
+            </a:r>
+          </a:p>
+          <a:p>
+            <a:pPr lvl="1"/>
+            <a:r>
+              <a:rPr lang="en-IN" dirty="0"/>
+              <a:t>Exponential Moving Average (EMA)</a:t>
+            </a:r>
+          </a:p>
+          <a:p>
+            <a:pPr lvl="1"/>
+            <a:r>
+              <a:rPr lang="en-IN" dirty="0"/>
+              <a:t>Average True Range (ATR)</a:t>
+            </a:r>
+          </a:p>
+          <a:p>
+            <a:pPr lvl="1"/>
+            <a:r>
+              <a:rPr lang="en-IN" dirty="0" err="1"/>
+              <a:t>SuperTrend</a:t>
+            </a:r>
+            <a:r>
+              <a:rPr lang="en-IN" dirty="0"/>
+              <a:t> (</a:t>
+            </a:r>
+            <a:r>
+              <a:rPr lang="en-IN" dirty="0" err="1"/>
+              <a:t>SuperTrend</a:t>
+            </a:r>
+            <a:r>
+              <a:rPr lang="en-IN" dirty="0"/>
+              <a:t>)</a:t>
+            </a:r>
+          </a:p>
+          <a:p>
+            <a:pPr marL="457200" lvl="1" indent="0">
+              <a:buNone/>
+            </a:pPr>
+            <a:r>
+              <a:rPr lang="en-IN" dirty="0"/>
+              <a:t>Using the above indicators, we intend to build a </a:t>
+            </a:r>
+            <a:r>
+              <a:rPr lang="en-IN"/>
+              <a:t>regression model</a:t>
+            </a:r>
+            <a:endParaRPr lang="en-IN" dirty="0"/>
+          </a:p>
+        </p:txBody>
+      </p:sp>
+    </p:spTree>
+    <p:extLst>
+      <p:ext uri="{BB962C8B-B14F-4D97-AF65-F5344CB8AC3E}">
+        <p14:creationId xmlns:p14="http://schemas.microsoft.com/office/powerpoint/2010/main" val="2423560379"/>
+      </p:ext>
+    </p:extLst>
+  </p:cSld>
+  <p:clrMapOvr>
+    <a:masterClrMapping/>
+  </p:clrMapOvr>
+</p:sld>
+</file>
+
 <file path=ppt/theme/theme1.xml><?xml version="1.0" encoding="utf-8"?>
 <a:theme xmlns:a="http://schemas.openxmlformats.org/drawingml/2006/main" name="Gallery">
   <a:themeElements>

</xml_diff>